<commit_message>
Bug Fixin and Enhanche Level Design
</commit_message>
<xml_diff>
--- a/05_Documentation/Presentation_Schrat.pptx
+++ b/05_Documentation/Presentation_Schrat.pptx
@@ -7,6 +7,8 @@
   <p:sldIdLst>
     <p:sldId id="256" r:id="rId2"/>
     <p:sldId id="257" r:id="rId3"/>
+    <p:sldId id="258" r:id="rId4"/>
+    <p:sldId id="259" r:id="rId5"/>
   </p:sldIdLst>
   <p:sldSz cx="12192000" cy="6858000"/>
   <p:notesSz cx="6858000" cy="9144000"/>
@@ -105,7 +107,16 @@
       </a:defRPr>
     </a:lvl9pPr>
   </p:defaultTextStyle>
+  <p:extLst>
+    <p:ext uri="{EFAFB233-063F-42B5-8137-9DF3F51BA10A}">
+      <p15:sldGuideLst xmlns:p15="http://schemas.microsoft.com/office/powerpoint/2012/main"/>
+    </p:ext>
+  </p:extLst>
 </p:presentation>
+</file>
+
+<file path=ppt/revisionInfo.xml><?xml version="1.0" encoding="utf-8"?>
+<p1510:revInfo xmlns:a="http://schemas.openxmlformats.org/drawingml/2006/main" xmlns:r="http://schemas.openxmlformats.org/officeDocument/2006/relationships" xmlns:p1510="http://schemas.microsoft.com/office/powerpoint/2015/10/main"/>
 </file>
 
 <file path=ppt/slideLayouts/slideLayout1.xml><?xml version="1.0" encoding="utf-8"?>
@@ -262,7 +273,7 @@
           <a:p>
             <a:fld id="{8CA90CAB-C411-4382-881D-402114AB875D}" type="datetimeFigureOut">
               <a:rPr lang="en-GB" smtClean="0"/>
-              <a:t>09/10/2017</a:t>
+              <a:t>10/10/2017</a:t>
             </a:fld>
             <a:endParaRPr lang="en-GB"/>
           </a:p>
@@ -462,7 +473,7 @@
           <a:p>
             <a:fld id="{8CA90CAB-C411-4382-881D-402114AB875D}" type="datetimeFigureOut">
               <a:rPr lang="en-GB" smtClean="0"/>
-              <a:t>09/10/2017</a:t>
+              <a:t>10/10/2017</a:t>
             </a:fld>
             <a:endParaRPr lang="en-GB"/>
           </a:p>
@@ -672,7 +683,7 @@
           <a:p>
             <a:fld id="{8CA90CAB-C411-4382-881D-402114AB875D}" type="datetimeFigureOut">
               <a:rPr lang="en-GB" smtClean="0"/>
-              <a:t>09/10/2017</a:t>
+              <a:t>10/10/2017</a:t>
             </a:fld>
             <a:endParaRPr lang="en-GB"/>
           </a:p>
@@ -748,6 +759,14 @@
 <file path=ppt/slideLayouts/slideLayout2.xml><?xml version="1.0" encoding="utf-8"?>
 <p:sldLayout xmlns:a="http://schemas.openxmlformats.org/drawingml/2006/main" xmlns:r="http://schemas.openxmlformats.org/officeDocument/2006/relationships" xmlns:p="http://schemas.openxmlformats.org/presentationml/2006/main" type="obj" preserve="1">
   <p:cSld name="Titel und Inhalt">
+    <p:bg>
+      <p:bgPr>
+        <a:solidFill>
+          <a:srgbClr val="262626"/>
+        </a:solidFill>
+        <a:effectLst/>
+      </p:bgPr>
+    </p:bg>
     <p:spTree>
       <p:nvGrpSpPr>
         <p:cNvPr id="1" name=""/>
@@ -905,7 +924,7 @@
           <a:p>
             <a:fld id="{8CA90CAB-C411-4382-881D-402114AB875D}" type="datetimeFigureOut">
               <a:rPr lang="en-GB" smtClean="0"/>
-              <a:t>09/10/2017</a:t>
+              <a:t>10/10/2017</a:t>
             </a:fld>
             <a:endParaRPr lang="en-GB"/>
           </a:p>
@@ -967,10 +986,10 @@
       </p:sp>
       <p:cxnSp>
         <p:nvCxnSpPr>
-          <p:cNvPr id="8" name="Gerader Verbinder 7">
-            <a:extLst>
-              <a:ext uri="{FF2B5EF4-FFF2-40B4-BE49-F238E27FC236}">
-                <a16:creationId xmlns:a16="http://schemas.microsoft.com/office/drawing/2014/main" id="{2389EAD6-D88A-4BE6-A151-FA4B2E9F3D6B}"/>
+          <p:cNvPr id="9" name="Gerader Verbinder 8">
+            <a:extLst>
+              <a:ext uri="{FF2B5EF4-FFF2-40B4-BE49-F238E27FC236}">
+                <a16:creationId xmlns:a16="http://schemas.microsoft.com/office/drawing/2014/main" id="{3067D7DE-A846-4B67-A731-DB6696713E69}"/>
               </a:ext>
             </a:extLst>
           </p:cNvPr>
@@ -979,7 +998,7 @@
         </p:nvCxnSpPr>
         <p:spPr>
           <a:xfrm>
-            <a:off x="838200" y="1690688"/>
+            <a:off x="838200" y="1756005"/>
             <a:ext cx="10515600" cy="0"/>
           </a:xfrm>
           <a:prstGeom prst="line">
@@ -987,9 +1006,9 @@
           </a:prstGeom>
           <a:ln>
             <a:solidFill>
-              <a:schemeClr val="tx1">
-                <a:lumMod val="95000"/>
-                <a:lumOff val="5000"/>
+              <a:schemeClr val="accent4">
+                <a:lumMod val="20000"/>
+                <a:lumOff val="80000"/>
               </a:schemeClr>
             </a:solidFill>
           </a:ln>
@@ -1229,7 +1248,7 @@
           <a:p>
             <a:fld id="{8CA90CAB-C411-4382-881D-402114AB875D}" type="datetimeFigureOut">
               <a:rPr lang="en-GB" smtClean="0"/>
-              <a:t>09/10/2017</a:t>
+              <a:t>10/10/2017</a:t>
             </a:fld>
             <a:endParaRPr lang="en-GB"/>
           </a:p>
@@ -1556,7 +1575,7 @@
           <a:p>
             <a:fld id="{8CA90CAB-C411-4382-881D-402114AB875D}" type="datetimeFigureOut">
               <a:rPr lang="en-GB" smtClean="0"/>
-              <a:t>09/10/2017</a:t>
+              <a:t>10/10/2017</a:t>
             </a:fld>
             <a:endParaRPr lang="en-GB"/>
           </a:p>
@@ -1616,6 +1635,50 @@
           </a:p>
         </p:txBody>
       </p:sp>
+      <p:cxnSp>
+        <p:nvCxnSpPr>
+          <p:cNvPr id="8" name="Gerader Verbinder 7">
+            <a:extLst>
+              <a:ext uri="{FF2B5EF4-FFF2-40B4-BE49-F238E27FC236}">
+                <a16:creationId xmlns:a16="http://schemas.microsoft.com/office/drawing/2014/main" id="{3CD55C70-3C56-4AAF-BCF1-A8EF13A4C95B}"/>
+              </a:ext>
+            </a:extLst>
+          </p:cNvPr>
+          <p:cNvCxnSpPr/>
+          <p:nvPr userDrawn="1"/>
+        </p:nvCxnSpPr>
+        <p:spPr>
+          <a:xfrm>
+            <a:off x="838200" y="1756005"/>
+            <a:ext cx="10515600" cy="0"/>
+          </a:xfrm>
+          <a:prstGeom prst="line">
+            <a:avLst/>
+          </a:prstGeom>
+          <a:ln>
+            <a:solidFill>
+              <a:schemeClr val="accent4">
+                <a:lumMod val="20000"/>
+                <a:lumOff val="80000"/>
+              </a:schemeClr>
+            </a:solidFill>
+          </a:ln>
+        </p:spPr>
+        <p:style>
+          <a:lnRef idx="1">
+            <a:schemeClr val="accent1"/>
+          </a:lnRef>
+          <a:fillRef idx="0">
+            <a:schemeClr val="accent1"/>
+          </a:fillRef>
+          <a:effectRef idx="0">
+            <a:schemeClr val="accent1"/>
+          </a:effectRef>
+          <a:fontRef idx="minor">
+            <a:schemeClr val="tx1"/>
+          </a:fontRef>
+        </p:style>
+      </p:cxnSp>
     </p:spTree>
     <p:extLst>
       <p:ext uri="{BB962C8B-B14F-4D97-AF65-F5344CB8AC3E}">
@@ -1971,7 +2034,7 @@
           <a:p>
             <a:fld id="{8CA90CAB-C411-4382-881D-402114AB875D}" type="datetimeFigureOut">
               <a:rPr lang="en-GB" smtClean="0"/>
-              <a:t>09/10/2017</a:t>
+              <a:t>10/10/2017</a:t>
             </a:fld>
             <a:endParaRPr lang="en-GB"/>
           </a:p>
@@ -2031,6 +2094,96 @@
           </a:p>
         </p:txBody>
       </p:sp>
+      <p:cxnSp>
+        <p:nvCxnSpPr>
+          <p:cNvPr id="10" name="Gerader Verbinder 9">
+            <a:extLst>
+              <a:ext uri="{FF2B5EF4-FFF2-40B4-BE49-F238E27FC236}">
+                <a16:creationId xmlns:a16="http://schemas.microsoft.com/office/drawing/2014/main" id="{16BA8BFE-C83E-44C0-82C8-23B591EF658A}"/>
+              </a:ext>
+            </a:extLst>
+          </p:cNvPr>
+          <p:cNvCxnSpPr/>
+          <p:nvPr userDrawn="1"/>
+        </p:nvCxnSpPr>
+        <p:spPr>
+          <a:xfrm>
+            <a:off x="838200" y="1756005"/>
+            <a:ext cx="10515600" cy="0"/>
+          </a:xfrm>
+          <a:prstGeom prst="line">
+            <a:avLst/>
+          </a:prstGeom>
+          <a:ln>
+            <a:solidFill>
+              <a:schemeClr val="accent4">
+                <a:lumMod val="20000"/>
+                <a:lumOff val="80000"/>
+              </a:schemeClr>
+            </a:solidFill>
+          </a:ln>
+        </p:spPr>
+        <p:style>
+          <a:lnRef idx="1">
+            <a:schemeClr val="accent1"/>
+          </a:lnRef>
+          <a:fillRef idx="0">
+            <a:schemeClr val="accent1"/>
+          </a:fillRef>
+          <a:effectRef idx="0">
+            <a:schemeClr val="accent1"/>
+          </a:effectRef>
+          <a:fontRef idx="minor">
+            <a:schemeClr val="tx1"/>
+          </a:fontRef>
+        </p:style>
+      </p:cxnSp>
+      <p:cxnSp>
+        <p:nvCxnSpPr>
+          <p:cNvPr id="11" name="Gerader Verbinder 10">
+            <a:extLst>
+              <a:ext uri="{FF2B5EF4-FFF2-40B4-BE49-F238E27FC236}">
+                <a16:creationId xmlns:a16="http://schemas.microsoft.com/office/drawing/2014/main" id="{824F68CD-99CC-4086-B136-FE89F547AD2D}"/>
+              </a:ext>
+            </a:extLst>
+          </p:cNvPr>
+          <p:cNvCxnSpPr>
+            <a:cxnSpLocks/>
+          </p:cNvCxnSpPr>
+          <p:nvPr userDrawn="1"/>
+        </p:nvCxnSpPr>
+        <p:spPr>
+          <a:xfrm>
+            <a:off x="6079598" y="2392500"/>
+            <a:ext cx="0" cy="3072386"/>
+          </a:xfrm>
+          <a:prstGeom prst="line">
+            <a:avLst/>
+          </a:prstGeom>
+          <a:ln>
+            <a:solidFill>
+              <a:schemeClr val="accent4">
+                <a:lumMod val="20000"/>
+                <a:lumOff val="80000"/>
+              </a:schemeClr>
+            </a:solidFill>
+          </a:ln>
+        </p:spPr>
+        <p:style>
+          <a:lnRef idx="1">
+            <a:schemeClr val="accent1"/>
+          </a:lnRef>
+          <a:fillRef idx="0">
+            <a:schemeClr val="accent1"/>
+          </a:fillRef>
+          <a:effectRef idx="0">
+            <a:schemeClr val="accent1"/>
+          </a:effectRef>
+          <a:fontRef idx="minor">
+            <a:schemeClr val="tx1"/>
+          </a:fontRef>
+        </p:style>
+      </p:cxnSp>
     </p:spTree>
     <p:extLst>
       <p:ext uri="{BB962C8B-B14F-4D97-AF65-F5344CB8AC3E}">
@@ -2113,7 +2266,7 @@
           <a:p>
             <a:fld id="{8CA90CAB-C411-4382-881D-402114AB875D}" type="datetimeFigureOut">
               <a:rPr lang="en-GB" smtClean="0"/>
-              <a:t>09/10/2017</a:t>
+              <a:t>10/10/2017</a:t>
             </a:fld>
             <a:endParaRPr lang="en-GB"/>
           </a:p>
@@ -2226,7 +2379,7 @@
           <a:p>
             <a:fld id="{8CA90CAB-C411-4382-881D-402114AB875D}" type="datetimeFigureOut">
               <a:rPr lang="en-GB" smtClean="0"/>
-              <a:t>09/10/2017</a:t>
+              <a:t>10/10/2017</a:t>
             </a:fld>
             <a:endParaRPr lang="en-GB"/>
           </a:p>
@@ -2539,7 +2692,7 @@
           <a:p>
             <a:fld id="{8CA90CAB-C411-4382-881D-402114AB875D}" type="datetimeFigureOut">
               <a:rPr lang="en-GB" smtClean="0"/>
-              <a:t>09/10/2017</a:t>
+              <a:t>10/10/2017</a:t>
             </a:fld>
             <a:endParaRPr lang="en-GB"/>
           </a:p>
@@ -2828,7 +2981,7 @@
           <a:p>
             <a:fld id="{8CA90CAB-C411-4382-881D-402114AB875D}" type="datetimeFigureOut">
               <a:rPr lang="en-GB" smtClean="0"/>
-              <a:t>09/10/2017</a:t>
+              <a:t>10/10/2017</a:t>
             </a:fld>
             <a:endParaRPr lang="en-GB"/>
           </a:p>
@@ -2905,9 +3058,12 @@
 <p:sldMaster xmlns:a="http://schemas.openxmlformats.org/drawingml/2006/main" xmlns:r="http://schemas.openxmlformats.org/officeDocument/2006/relationships" xmlns:p="http://schemas.openxmlformats.org/presentationml/2006/main">
   <p:cSld>
     <p:bg>
-      <p:bgRef idx="1001">
-        <a:schemeClr val="bg1"/>
-      </p:bgRef>
+      <p:bgPr>
+        <a:solidFill>
+          <a:srgbClr val="262626"/>
+        </a:solidFill>
+        <a:effectLst/>
+      </p:bgPr>
     </p:bg>
     <p:spTree>
       <p:nvGrpSpPr>
@@ -2947,6 +3103,9 @@
           <a:prstGeom prst="rect">
             <a:avLst/>
           </a:prstGeom>
+          <a:solidFill>
+            <a:srgbClr val="262626"/>
+          </a:solidFill>
         </p:spPr>
         <p:txBody>
           <a:bodyPr vert="horz" lIns="91440" tIns="45720" rIns="91440" bIns="45720" rtlCol="0" anchor="ctr">
@@ -2999,38 +3158,38 @@
           <a:p>
             <a:pPr lvl="0"/>
             <a:r>
-              <a:rPr lang="de-DE"/>
+              <a:rPr lang="de-DE" dirty="0"/>
               <a:t>Formatvorlagen des Textmasters bearbeiten</a:t>
             </a:r>
           </a:p>
           <a:p>
             <a:pPr lvl="1"/>
             <a:r>
-              <a:rPr lang="de-DE"/>
+              <a:rPr lang="de-DE" dirty="0"/>
               <a:t>Zweite Ebene</a:t>
             </a:r>
           </a:p>
           <a:p>
             <a:pPr lvl="2"/>
             <a:r>
-              <a:rPr lang="de-DE"/>
+              <a:rPr lang="de-DE" dirty="0"/>
               <a:t>Dritte Ebene</a:t>
             </a:r>
           </a:p>
           <a:p>
             <a:pPr lvl="3"/>
             <a:r>
-              <a:rPr lang="de-DE"/>
+              <a:rPr lang="de-DE" dirty="0"/>
               <a:t>Vierte Ebene</a:t>
             </a:r>
           </a:p>
           <a:p>
             <a:pPr lvl="4"/>
             <a:r>
-              <a:rPr lang="de-DE"/>
+              <a:rPr lang="de-DE" dirty="0"/>
               <a:t>Fünfte Ebene</a:t>
             </a:r>
-            <a:endParaRPr lang="en-GB"/>
+            <a:endParaRPr lang="en-GB" dirty="0"/>
           </a:p>
         </p:txBody>
       </p:sp>
@@ -3075,7 +3234,7 @@
           <a:p>
             <a:fld id="{8CA90CAB-C411-4382-881D-402114AB875D}" type="datetimeFigureOut">
               <a:rPr lang="en-GB" smtClean="0"/>
-              <a:t>09/10/2017</a:t>
+              <a:t>10/10/2017</a:t>
             </a:fld>
             <a:endParaRPr lang="en-GB"/>
           </a:p>
@@ -3204,7 +3363,10 @@
         <a:buNone/>
         <a:defRPr sz="4400" kern="1200">
           <a:solidFill>
-            <a:schemeClr val="tx1"/>
+            <a:schemeClr val="accent4">
+              <a:lumMod val="40000"/>
+              <a:lumOff val="60000"/>
+            </a:schemeClr>
           </a:solidFill>
           <a:latin typeface="BrokenscriptOT-Bold" panose="04010805040101010101" pitchFamily="82" charset="0"/>
           <a:ea typeface="+mj-ea"/>
@@ -3224,7 +3386,7 @@
         <a:buChar char="•"/>
         <a:defRPr sz="2800" kern="1200">
           <a:solidFill>
-            <a:schemeClr val="tx1"/>
+            <a:schemeClr val="bg1"/>
           </a:solidFill>
           <a:latin typeface="Agency FB" panose="020B0503020202020204" pitchFamily="34" charset="0"/>
           <a:ea typeface="+mn-ea"/>
@@ -3242,7 +3404,7 @@
         <a:buChar char="•"/>
         <a:defRPr sz="2400" kern="1200">
           <a:solidFill>
-            <a:schemeClr val="tx1"/>
+            <a:schemeClr val="bg1"/>
           </a:solidFill>
           <a:latin typeface="Agency FB" panose="020B0503020202020204" pitchFamily="34" charset="0"/>
           <a:ea typeface="+mn-ea"/>
@@ -3260,7 +3422,7 @@
         <a:buChar char="•"/>
         <a:defRPr sz="2000" kern="1200">
           <a:solidFill>
-            <a:schemeClr val="tx1"/>
+            <a:schemeClr val="bg1"/>
           </a:solidFill>
           <a:latin typeface="Agency FB" panose="020B0503020202020204" pitchFamily="34" charset="0"/>
           <a:ea typeface="+mn-ea"/>
@@ -3278,7 +3440,7 @@
         <a:buChar char="•"/>
         <a:defRPr sz="1800" kern="1200">
           <a:solidFill>
-            <a:schemeClr val="tx1"/>
+            <a:schemeClr val="bg1"/>
           </a:solidFill>
           <a:latin typeface="Agency FB" panose="020B0503020202020204" pitchFamily="34" charset="0"/>
           <a:ea typeface="+mn-ea"/>
@@ -3296,7 +3458,7 @@
         <a:buChar char="•"/>
         <a:defRPr sz="1800" kern="1200">
           <a:solidFill>
-            <a:schemeClr val="tx1"/>
+            <a:schemeClr val="bg1"/>
           </a:solidFill>
           <a:latin typeface="Agency FB" panose="020B0503020202020204" pitchFamily="34" charset="0"/>
           <a:ea typeface="+mn-ea"/>
@@ -3532,7 +3694,9 @@
             <a:r>
               <a:rPr lang="en-GB" b="1" dirty="0" err="1">
                 <a:solidFill>
-                  <a:schemeClr val="bg1"/>
+                  <a:schemeClr val="accent2">
+                    <a:lumMod val="75000"/>
+                  </a:schemeClr>
                 </a:solidFill>
                 <a:latin typeface="BrokenscriptOT-Bold" panose="04010805040101010101" pitchFamily="82" charset="0"/>
                 <a:cs typeface="BrokenscriptOT-Bold" panose="04010805040101010101" pitchFamily="82" charset="0"/>
@@ -3541,7 +3705,9 @@
             </a:r>
             <a:endParaRPr lang="en-GB" b="1" dirty="0">
               <a:solidFill>
-                <a:schemeClr val="bg1"/>
+                <a:schemeClr val="accent2">
+                  <a:lumMod val="75000"/>
+                </a:schemeClr>
               </a:solidFill>
               <a:latin typeface="BrokenscriptOT-Bold" panose="04010805040101010101" pitchFamily="82" charset="0"/>
               <a:cs typeface="BrokenscriptOT-Bold" panose="04010805040101010101" pitchFamily="82" charset="0"/>
@@ -3567,13 +3733,24 @@
         </p:nvSpPr>
         <p:spPr>
           <a:xfrm>
-            <a:off x="1524000" y="3881956"/>
+            <a:off x="1523999" y="3789881"/>
             <a:ext cx="9144000" cy="1655762"/>
           </a:xfrm>
         </p:spPr>
         <p:txBody>
           <a:bodyPr/>
           <a:lstStyle/>
+          <a:p>
+            <a:r>
+              <a:rPr lang="en-GB" b="0" dirty="0">
+                <a:solidFill>
+                  <a:schemeClr val="bg1"/>
+                </a:solidFill>
+                <a:latin typeface="Agency FB" panose="020B0503020202020204" pitchFamily="34" charset="0"/>
+              </a:rPr>
+              <a:t>Ein Labyrinth Puzzle Spiel</a:t>
+            </a:r>
+          </a:p>
           <a:p>
             <a:r>
               <a:rPr lang="en-GB" b="1" dirty="0">
@@ -3842,6 +4019,55 @@
                       </p:childTnLst>
                     </p:cTn>
                   </p:par>
+                  <p:par>
+                    <p:cTn id="17" fill="hold">
+                      <p:stCondLst>
+                        <p:cond delay="indefinite"/>
+                      </p:stCondLst>
+                      <p:childTnLst>
+                        <p:par>
+                          <p:cTn id="18" fill="hold">
+                            <p:stCondLst>
+                              <p:cond delay="0"/>
+                            </p:stCondLst>
+                            <p:childTnLst>
+                              <p:par>
+                                <p:cTn id="19" presetID="1" presetClass="entr" presetSubtype="0" fill="hold" grpId="0" nodeType="clickEffect">
+                                  <p:stCondLst>
+                                    <p:cond delay="0"/>
+                                  </p:stCondLst>
+                                  <p:childTnLst>
+                                    <p:set>
+                                      <p:cBhvr>
+                                        <p:cTn id="20" dur="1" fill="hold">
+                                          <p:stCondLst>
+                                            <p:cond delay="0"/>
+                                          </p:stCondLst>
+                                        </p:cTn>
+                                        <p:tgtEl>
+                                          <p:spTgt spid="3">
+                                            <p:txEl>
+                                              <p:pRg st="1" end="1"/>
+                                            </p:txEl>
+                                          </p:spTgt>
+                                        </p:tgtEl>
+                                        <p:attrNameLst>
+                                          <p:attrName>style.visibility</p:attrName>
+                                        </p:attrNameLst>
+                                      </p:cBhvr>
+                                      <p:to>
+                                        <p:strVal val="visible"/>
+                                      </p:to>
+                                    </p:set>
+                                  </p:childTnLst>
+                                </p:cTn>
+                              </p:par>
+                            </p:childTnLst>
+                          </p:cTn>
+                        </p:par>
+                      </p:childTnLst>
+                    </p:cTn>
+                  </p:par>
                 </p:childTnLst>
               </p:cTn>
               <p:prevCondLst>
@@ -3864,7 +4090,7 @@
       </p:par>
     </p:tnLst>
     <p:bldLst>
-      <p:bldP spid="2" grpId="0"/>
+      <p:bldP spid="2" grpId="0" animBg="1"/>
       <p:bldP spid="3" grpId="0" build="p"/>
     </p:bldLst>
   </p:timing>
@@ -3904,11 +4130,22 @@
             <p:ph type="title"/>
           </p:nvPr>
         </p:nvSpPr>
-        <p:spPr/>
-        <p:txBody>
-          <a:bodyPr/>
-          <a:lstStyle/>
-          <a:p>
+        <p:spPr>
+          <a:xfrm>
+            <a:off x="838200" y="876854"/>
+            <a:ext cx="10515600" cy="423440"/>
+          </a:xfrm>
+        </p:spPr>
+        <p:txBody>
+          <a:bodyPr>
+            <a:normAutofit fontScale="90000"/>
+          </a:bodyPr>
+          <a:lstStyle/>
+          <a:p>
+            <a:r>
+              <a:rPr lang="en-GB" dirty="0" err="1"/>
+              <a:t>Konzeption</a:t>
+            </a:r>
             <a:endParaRPr lang="en-GB" dirty="0"/>
           </a:p>
         </p:txBody>
@@ -3929,19 +4166,612 @@
             <p:ph idx="1"/>
           </p:nvPr>
         </p:nvSpPr>
-        <p:spPr/>
-        <p:txBody>
-          <a:bodyPr/>
-          <a:lstStyle/>
-          <a:p>
-            <a:endParaRPr lang="en-GB"/>
-          </a:p>
-        </p:txBody>
-      </p:sp>
+        <p:spPr>
+          <a:xfrm>
+            <a:off x="838200" y="1825625"/>
+            <a:ext cx="10515600" cy="456181"/>
+          </a:xfrm>
+        </p:spPr>
+        <p:txBody>
+          <a:bodyPr>
+            <a:normAutofit lnSpcReduction="10000"/>
+          </a:bodyPr>
+          <a:lstStyle/>
+          <a:p>
+            <a:r>
+              <a:rPr lang="en-GB" dirty="0" err="1"/>
+              <a:t>Inspirationen</a:t>
+            </a:r>
+            <a:endParaRPr lang="en-GB" dirty="0"/>
+          </a:p>
+        </p:txBody>
+      </p:sp>
+      <p:pic>
+        <p:nvPicPr>
+          <p:cNvPr id="5" name="Grafik 4">
+            <a:extLst>
+              <a:ext uri="{FF2B5EF4-FFF2-40B4-BE49-F238E27FC236}">
+                <a16:creationId xmlns:a16="http://schemas.microsoft.com/office/drawing/2014/main" id="{36B86C3D-05B9-4498-A1D6-814A47220BDB}"/>
+              </a:ext>
+            </a:extLst>
+          </p:cNvPr>
+          <p:cNvPicPr>
+            <a:picLocks noChangeAspect="1"/>
+          </p:cNvPicPr>
+          <p:nvPr/>
+        </p:nvPicPr>
+        <p:blipFill>
+          <a:blip r:embed="rId2">
+            <a:extLst>
+              <a:ext uri="{28A0092B-C50C-407E-A947-70E740481C1C}">
+                <a14:useLocalDpi xmlns:a14="http://schemas.microsoft.com/office/drawing/2010/main" val="0"/>
+              </a:ext>
+            </a:extLst>
+          </a:blip>
+          <a:stretch>
+            <a:fillRect/>
+          </a:stretch>
+        </p:blipFill>
+        <p:spPr>
+          <a:xfrm>
+            <a:off x="7999444" y="2416743"/>
+            <a:ext cx="2743200" cy="3826764"/>
+          </a:xfrm>
+          <a:prstGeom prst="rect">
+            <a:avLst/>
+          </a:prstGeom>
+        </p:spPr>
+      </p:pic>
+      <p:pic>
+        <p:nvPicPr>
+          <p:cNvPr id="7" name="Grafik 6">
+            <a:extLst>
+              <a:ext uri="{FF2B5EF4-FFF2-40B4-BE49-F238E27FC236}">
+                <a16:creationId xmlns:a16="http://schemas.microsoft.com/office/drawing/2014/main" id="{3F42E885-D136-4261-A0EE-9AA286EB6890}"/>
+              </a:ext>
+            </a:extLst>
+          </p:cNvPr>
+          <p:cNvPicPr>
+            <a:picLocks noChangeAspect="1"/>
+          </p:cNvPicPr>
+          <p:nvPr/>
+        </p:nvPicPr>
+        <p:blipFill>
+          <a:blip r:embed="rId3">
+            <a:extLst>
+              <a:ext uri="{28A0092B-C50C-407E-A947-70E740481C1C}">
+                <a14:useLocalDpi xmlns:a14="http://schemas.microsoft.com/office/drawing/2010/main" val="0"/>
+              </a:ext>
+            </a:extLst>
+          </a:blip>
+          <a:stretch>
+            <a:fillRect/>
+          </a:stretch>
+        </p:blipFill>
+        <p:spPr>
+          <a:xfrm>
+            <a:off x="970383" y="2416743"/>
+            <a:ext cx="2764971" cy="3829485"/>
+          </a:xfrm>
+          <a:prstGeom prst="rect">
+            <a:avLst/>
+          </a:prstGeom>
+        </p:spPr>
+      </p:pic>
     </p:spTree>
     <p:extLst>
       <p:ext uri="{BB962C8B-B14F-4D97-AF65-F5344CB8AC3E}">
         <p14:creationId xmlns:p14="http://schemas.microsoft.com/office/powerpoint/2010/main" val="3794586713"/>
+      </p:ext>
+    </p:extLst>
+  </p:cSld>
+  <p:clrMapOvr>
+    <a:masterClrMapping/>
+  </p:clrMapOvr>
+  <p:timing>
+    <p:tnLst>
+      <p:par>
+        <p:cTn id="1" dur="indefinite" restart="never" nodeType="tmRoot">
+          <p:childTnLst>
+            <p:seq concurrent="1" nextAc="seek">
+              <p:cTn id="2" dur="indefinite" nodeType="mainSeq">
+                <p:childTnLst>
+                  <p:par>
+                    <p:cTn id="3" fill="hold">
+                      <p:stCondLst>
+                        <p:cond delay="indefinite"/>
+                      </p:stCondLst>
+                      <p:childTnLst>
+                        <p:par>
+                          <p:cTn id="4" fill="hold">
+                            <p:stCondLst>
+                              <p:cond delay="0"/>
+                            </p:stCondLst>
+                            <p:childTnLst>
+                              <p:par>
+                                <p:cTn id="5" presetID="42" presetClass="entr" presetSubtype="0" fill="hold" nodeType="clickEffect">
+                                  <p:stCondLst>
+                                    <p:cond delay="0"/>
+                                  </p:stCondLst>
+                                  <p:childTnLst>
+                                    <p:set>
+                                      <p:cBhvr>
+                                        <p:cTn id="6" dur="1" fill="hold">
+                                          <p:stCondLst>
+                                            <p:cond delay="0"/>
+                                          </p:stCondLst>
+                                        </p:cTn>
+                                        <p:tgtEl>
+                                          <p:spTgt spid="7"/>
+                                        </p:tgtEl>
+                                        <p:attrNameLst>
+                                          <p:attrName>style.visibility</p:attrName>
+                                        </p:attrNameLst>
+                                      </p:cBhvr>
+                                      <p:to>
+                                        <p:strVal val="visible"/>
+                                      </p:to>
+                                    </p:set>
+                                    <p:animEffect transition="in" filter="fade">
+                                      <p:cBhvr>
+                                        <p:cTn id="7" dur="250"/>
+                                        <p:tgtEl>
+                                          <p:spTgt spid="7"/>
+                                        </p:tgtEl>
+                                      </p:cBhvr>
+                                    </p:animEffect>
+                                    <p:anim calcmode="lin" valueType="num">
+                                      <p:cBhvr>
+                                        <p:cTn id="8" dur="250" fill="hold"/>
+                                        <p:tgtEl>
+                                          <p:spTgt spid="7"/>
+                                        </p:tgtEl>
+                                        <p:attrNameLst>
+                                          <p:attrName>ppt_x</p:attrName>
+                                        </p:attrNameLst>
+                                      </p:cBhvr>
+                                      <p:tavLst>
+                                        <p:tav tm="0">
+                                          <p:val>
+                                            <p:strVal val="#ppt_x"/>
+                                          </p:val>
+                                        </p:tav>
+                                        <p:tav tm="100000">
+                                          <p:val>
+                                            <p:strVal val="#ppt_x"/>
+                                          </p:val>
+                                        </p:tav>
+                                      </p:tavLst>
+                                    </p:anim>
+                                    <p:anim calcmode="lin" valueType="num">
+                                      <p:cBhvr>
+                                        <p:cTn id="9" dur="250" fill="hold"/>
+                                        <p:tgtEl>
+                                          <p:spTgt spid="7"/>
+                                        </p:tgtEl>
+                                        <p:attrNameLst>
+                                          <p:attrName>ppt_y</p:attrName>
+                                        </p:attrNameLst>
+                                      </p:cBhvr>
+                                      <p:tavLst>
+                                        <p:tav tm="0">
+                                          <p:val>
+                                            <p:strVal val="#ppt_y+.1"/>
+                                          </p:val>
+                                        </p:tav>
+                                        <p:tav tm="100000">
+                                          <p:val>
+                                            <p:strVal val="#ppt_y"/>
+                                          </p:val>
+                                        </p:tav>
+                                      </p:tavLst>
+                                    </p:anim>
+                                  </p:childTnLst>
+                                </p:cTn>
+                              </p:par>
+                            </p:childTnLst>
+                          </p:cTn>
+                        </p:par>
+                        <p:par>
+                          <p:cTn id="10" fill="hold">
+                            <p:stCondLst>
+                              <p:cond delay="250"/>
+                            </p:stCondLst>
+                            <p:childTnLst>
+                              <p:par>
+                                <p:cTn id="11" presetID="42" presetClass="entr" presetSubtype="0" fill="hold" nodeType="afterEffect">
+                                  <p:stCondLst>
+                                    <p:cond delay="0"/>
+                                  </p:stCondLst>
+                                  <p:childTnLst>
+                                    <p:set>
+                                      <p:cBhvr>
+                                        <p:cTn id="12" dur="1" fill="hold">
+                                          <p:stCondLst>
+                                            <p:cond delay="0"/>
+                                          </p:stCondLst>
+                                        </p:cTn>
+                                        <p:tgtEl>
+                                          <p:spTgt spid="5"/>
+                                        </p:tgtEl>
+                                        <p:attrNameLst>
+                                          <p:attrName>style.visibility</p:attrName>
+                                        </p:attrNameLst>
+                                      </p:cBhvr>
+                                      <p:to>
+                                        <p:strVal val="visible"/>
+                                      </p:to>
+                                    </p:set>
+                                    <p:animEffect transition="in" filter="fade">
+                                      <p:cBhvr>
+                                        <p:cTn id="13" dur="300"/>
+                                        <p:tgtEl>
+                                          <p:spTgt spid="5"/>
+                                        </p:tgtEl>
+                                      </p:cBhvr>
+                                    </p:animEffect>
+                                    <p:anim calcmode="lin" valueType="num">
+                                      <p:cBhvr>
+                                        <p:cTn id="14" dur="300" fill="hold"/>
+                                        <p:tgtEl>
+                                          <p:spTgt spid="5"/>
+                                        </p:tgtEl>
+                                        <p:attrNameLst>
+                                          <p:attrName>ppt_x</p:attrName>
+                                        </p:attrNameLst>
+                                      </p:cBhvr>
+                                      <p:tavLst>
+                                        <p:tav tm="0">
+                                          <p:val>
+                                            <p:strVal val="#ppt_x"/>
+                                          </p:val>
+                                        </p:tav>
+                                        <p:tav tm="100000">
+                                          <p:val>
+                                            <p:strVal val="#ppt_x"/>
+                                          </p:val>
+                                        </p:tav>
+                                      </p:tavLst>
+                                    </p:anim>
+                                    <p:anim calcmode="lin" valueType="num">
+                                      <p:cBhvr>
+                                        <p:cTn id="15" dur="300" fill="hold"/>
+                                        <p:tgtEl>
+                                          <p:spTgt spid="5"/>
+                                        </p:tgtEl>
+                                        <p:attrNameLst>
+                                          <p:attrName>ppt_y</p:attrName>
+                                        </p:attrNameLst>
+                                      </p:cBhvr>
+                                      <p:tavLst>
+                                        <p:tav tm="0">
+                                          <p:val>
+                                            <p:strVal val="#ppt_y+.1"/>
+                                          </p:val>
+                                        </p:tav>
+                                        <p:tav tm="100000">
+                                          <p:val>
+                                            <p:strVal val="#ppt_y"/>
+                                          </p:val>
+                                        </p:tav>
+                                      </p:tavLst>
+                                    </p:anim>
+                                  </p:childTnLst>
+                                </p:cTn>
+                              </p:par>
+                            </p:childTnLst>
+                          </p:cTn>
+                        </p:par>
+                      </p:childTnLst>
+                    </p:cTn>
+                  </p:par>
+                </p:childTnLst>
+              </p:cTn>
+              <p:prevCondLst>
+                <p:cond evt="onPrev" delay="0">
+                  <p:tgtEl>
+                    <p:sldTgt/>
+                  </p:tgtEl>
+                </p:cond>
+              </p:prevCondLst>
+              <p:nextCondLst>
+                <p:cond evt="onNext" delay="0">
+                  <p:tgtEl>
+                    <p:sldTgt/>
+                  </p:tgtEl>
+                </p:cond>
+              </p:nextCondLst>
+            </p:seq>
+          </p:childTnLst>
+        </p:cTn>
+      </p:par>
+    </p:tnLst>
+  </p:timing>
+</p:sld>
+</file>
+
+<file path=ppt/slides/slide3.xml><?xml version="1.0" encoding="utf-8"?>
+<p:sld xmlns:a="http://schemas.openxmlformats.org/drawingml/2006/main" xmlns:r="http://schemas.openxmlformats.org/officeDocument/2006/relationships" xmlns:p="http://schemas.openxmlformats.org/presentationml/2006/main">
+  <p:cSld>
+    <p:spTree>
+      <p:nvGrpSpPr>
+        <p:cNvPr id="1" name=""/>
+        <p:cNvGrpSpPr/>
+        <p:nvPr/>
+      </p:nvGrpSpPr>
+      <p:grpSpPr>
+        <a:xfrm>
+          <a:off x="0" y="0"/>
+          <a:ext cx="0" cy="0"/>
+          <a:chOff x="0" y="0"/>
+          <a:chExt cx="0" cy="0"/>
+        </a:xfrm>
+      </p:grpSpPr>
+      <p:sp>
+        <p:nvSpPr>
+          <p:cNvPr id="4" name="Titel 3">
+            <a:extLst>
+              <a:ext uri="{FF2B5EF4-FFF2-40B4-BE49-F238E27FC236}">
+                <a16:creationId xmlns:a16="http://schemas.microsoft.com/office/drawing/2014/main" id="{775C94D2-951B-4FB1-AC5B-9D028396B0BB}"/>
+              </a:ext>
+            </a:extLst>
+          </p:cNvPr>
+          <p:cNvSpPr>
+            <a:spLocks noGrp="1"/>
+          </p:cNvSpPr>
+          <p:nvPr>
+            <p:ph type="title"/>
+          </p:nvPr>
+        </p:nvSpPr>
+        <p:spPr>
+          <a:xfrm>
+            <a:off x="839788" y="365125"/>
+            <a:ext cx="10515600" cy="1253950"/>
+          </a:xfrm>
+        </p:spPr>
+        <p:txBody>
+          <a:bodyPr>
+            <a:normAutofit/>
+          </a:bodyPr>
+          <a:lstStyle/>
+          <a:p>
+            <a:r>
+              <a:rPr lang="en-GB" dirty="0" err="1"/>
+              <a:t>Konzeption</a:t>
+            </a:r>
+            <a:endParaRPr lang="en-GB" dirty="0"/>
+          </a:p>
+        </p:txBody>
+      </p:sp>
+      <p:sp>
+        <p:nvSpPr>
+          <p:cNvPr id="5" name="Textplatzhalter 4">
+            <a:extLst>
+              <a:ext uri="{FF2B5EF4-FFF2-40B4-BE49-F238E27FC236}">
+                <a16:creationId xmlns:a16="http://schemas.microsoft.com/office/drawing/2014/main" id="{C715A82E-561C-4371-8247-83AACAE2F73F}"/>
+              </a:ext>
+            </a:extLst>
+          </p:cNvPr>
+          <p:cNvSpPr>
+            <a:spLocks noGrp="1"/>
+          </p:cNvSpPr>
+          <p:nvPr>
+            <p:ph type="body" idx="1"/>
+          </p:nvPr>
+        </p:nvSpPr>
+        <p:spPr/>
+        <p:txBody>
+          <a:bodyPr>
+            <a:normAutofit/>
+          </a:bodyPr>
+          <a:lstStyle/>
+          <a:p>
+            <a:r>
+              <a:rPr lang="en-GB" sz="3200" dirty="0"/>
+              <a:t>Secret Quest (Atari 2600)</a:t>
+            </a:r>
+          </a:p>
+        </p:txBody>
+      </p:sp>
+      <p:sp>
+        <p:nvSpPr>
+          <p:cNvPr id="6" name="Inhaltsplatzhalter 5">
+            <a:extLst>
+              <a:ext uri="{FF2B5EF4-FFF2-40B4-BE49-F238E27FC236}">
+                <a16:creationId xmlns:a16="http://schemas.microsoft.com/office/drawing/2014/main" id="{2624E057-76D9-484F-9702-03EA000698D1}"/>
+              </a:ext>
+            </a:extLst>
+          </p:cNvPr>
+          <p:cNvSpPr>
+            <a:spLocks noGrp="1"/>
+          </p:cNvSpPr>
+          <p:nvPr>
+            <p:ph sz="half" idx="2"/>
+          </p:nvPr>
+        </p:nvSpPr>
+        <p:spPr/>
+        <p:txBody>
+          <a:bodyPr/>
+          <a:lstStyle/>
+          <a:p>
+            <a:r>
+              <a:rPr lang="en-GB" dirty="0"/>
+              <a:t>Labyrinth</a:t>
+            </a:r>
+          </a:p>
+          <a:p>
+            <a:r>
+              <a:rPr lang="en-GB" dirty="0" err="1"/>
+              <a:t>Orientierung</a:t>
+            </a:r>
+            <a:endParaRPr lang="en-GB" dirty="0"/>
+          </a:p>
+          <a:p>
+            <a:r>
+              <a:rPr lang="en-GB" dirty="0" err="1"/>
+              <a:t>Limitierte</a:t>
+            </a:r>
+            <a:r>
+              <a:rPr lang="en-GB" dirty="0"/>
+              <a:t> </a:t>
+            </a:r>
+            <a:r>
+              <a:rPr lang="en-GB" dirty="0" err="1"/>
+              <a:t>Ressourcen</a:t>
+            </a:r>
+            <a:endParaRPr lang="en-GB" dirty="0"/>
+          </a:p>
+        </p:txBody>
+      </p:sp>
+      <p:sp>
+        <p:nvSpPr>
+          <p:cNvPr id="7" name="Textplatzhalter 6">
+            <a:extLst>
+              <a:ext uri="{FF2B5EF4-FFF2-40B4-BE49-F238E27FC236}">
+                <a16:creationId xmlns:a16="http://schemas.microsoft.com/office/drawing/2014/main" id="{5637EC93-8B1F-428C-B3DB-C519445C312E}"/>
+              </a:ext>
+            </a:extLst>
+          </p:cNvPr>
+          <p:cNvSpPr>
+            <a:spLocks noGrp="1"/>
+          </p:cNvSpPr>
+          <p:nvPr>
+            <p:ph type="body" sz="quarter" idx="3"/>
+          </p:nvPr>
+        </p:nvSpPr>
+        <p:spPr/>
+        <p:txBody>
+          <a:bodyPr>
+            <a:normAutofit/>
+          </a:bodyPr>
+          <a:lstStyle/>
+          <a:p>
+            <a:r>
+              <a:rPr lang="en-GB" sz="3200" dirty="0"/>
+              <a:t>Xenophobe (Atari 7800)</a:t>
+            </a:r>
+          </a:p>
+        </p:txBody>
+      </p:sp>
+      <p:sp>
+        <p:nvSpPr>
+          <p:cNvPr id="8" name="Inhaltsplatzhalter 7">
+            <a:extLst>
+              <a:ext uri="{FF2B5EF4-FFF2-40B4-BE49-F238E27FC236}">
+                <a16:creationId xmlns:a16="http://schemas.microsoft.com/office/drawing/2014/main" id="{B5ACF965-7E90-437D-BEC0-0B03EAE68C75}"/>
+              </a:ext>
+            </a:extLst>
+          </p:cNvPr>
+          <p:cNvSpPr>
+            <a:spLocks noGrp="1"/>
+          </p:cNvSpPr>
+          <p:nvPr>
+            <p:ph sz="quarter" idx="4"/>
+          </p:nvPr>
+        </p:nvSpPr>
+        <p:spPr/>
+        <p:txBody>
+          <a:bodyPr/>
+          <a:lstStyle/>
+          <a:p>
+            <a:r>
+              <a:rPr lang="en-GB" dirty="0" err="1"/>
+              <a:t>Gegnerverhalten</a:t>
+            </a:r>
+            <a:endParaRPr lang="en-GB" dirty="0"/>
+          </a:p>
+          <a:p>
+            <a:r>
+              <a:rPr lang="en-GB" dirty="0"/>
+              <a:t>Character Visuals</a:t>
+            </a:r>
+          </a:p>
+        </p:txBody>
+      </p:sp>
+    </p:spTree>
+    <p:extLst>
+      <p:ext uri="{BB962C8B-B14F-4D97-AF65-F5344CB8AC3E}">
+        <p14:creationId xmlns:p14="http://schemas.microsoft.com/office/powerpoint/2010/main" val="1582150676"/>
+      </p:ext>
+    </p:extLst>
+  </p:cSld>
+  <p:clrMapOvr>
+    <a:masterClrMapping/>
+  </p:clrMapOvr>
+</p:sld>
+</file>
+
+<file path=ppt/slides/slide4.xml><?xml version="1.0" encoding="utf-8"?>
+<p:sld xmlns:a="http://schemas.openxmlformats.org/drawingml/2006/main" xmlns:r="http://schemas.openxmlformats.org/officeDocument/2006/relationships" xmlns:p="http://schemas.openxmlformats.org/presentationml/2006/main">
+  <p:cSld>
+    <p:spTree>
+      <p:nvGrpSpPr>
+        <p:cNvPr id="1" name=""/>
+        <p:cNvGrpSpPr/>
+        <p:nvPr/>
+      </p:nvGrpSpPr>
+      <p:grpSpPr>
+        <a:xfrm>
+          <a:off x="0" y="0"/>
+          <a:ext cx="0" cy="0"/>
+          <a:chOff x="0" y="0"/>
+          <a:chExt cx="0" cy="0"/>
+        </a:xfrm>
+      </p:grpSpPr>
+      <p:sp>
+        <p:nvSpPr>
+          <p:cNvPr id="7" name="Titel 6">
+            <a:extLst>
+              <a:ext uri="{FF2B5EF4-FFF2-40B4-BE49-F238E27FC236}">
+                <a16:creationId xmlns:a16="http://schemas.microsoft.com/office/drawing/2014/main" id="{5006D8DF-058C-428D-AE87-6CB16020F225}"/>
+              </a:ext>
+            </a:extLst>
+          </p:cNvPr>
+          <p:cNvSpPr>
+            <a:spLocks noGrp="1"/>
+          </p:cNvSpPr>
+          <p:nvPr>
+            <p:ph type="title"/>
+          </p:nvPr>
+        </p:nvSpPr>
+        <p:spPr/>
+        <p:txBody>
+          <a:bodyPr/>
+          <a:lstStyle/>
+          <a:p>
+            <a:endParaRPr lang="en-GB"/>
+          </a:p>
+        </p:txBody>
+      </p:sp>
+      <p:sp>
+        <p:nvSpPr>
+          <p:cNvPr id="8" name="Inhaltsplatzhalter 7">
+            <a:extLst>
+              <a:ext uri="{FF2B5EF4-FFF2-40B4-BE49-F238E27FC236}">
+                <a16:creationId xmlns:a16="http://schemas.microsoft.com/office/drawing/2014/main" id="{CA0C1F68-3EDD-4B33-9D22-393C909A69D5}"/>
+              </a:ext>
+            </a:extLst>
+          </p:cNvPr>
+          <p:cNvSpPr>
+            <a:spLocks noGrp="1"/>
+          </p:cNvSpPr>
+          <p:nvPr>
+            <p:ph idx="1"/>
+          </p:nvPr>
+        </p:nvSpPr>
+        <p:spPr/>
+        <p:txBody>
+          <a:bodyPr/>
+          <a:lstStyle/>
+          <a:p>
+            <a:endParaRPr lang="en-GB"/>
+          </a:p>
+        </p:txBody>
+      </p:sp>
+    </p:spTree>
+    <p:extLst>
+      <p:ext uri="{BB962C8B-B14F-4D97-AF65-F5344CB8AC3E}">
+        <p14:creationId xmlns:p14="http://schemas.microsoft.com/office/powerpoint/2010/main" val="136265468"/>
       </p:ext>
     </p:extLst>
   </p:cSld>

</xml_diff>